<commit_message>
11/1/17 Test auto strategy update
</commit_message>
<xml_diff>
--- a/2017AutomationStrategy.pptx
+++ b/2017AutomationStrategy.pptx
@@ -106,6 +106,11 @@
       </a:defRPr>
     </a:lvl9pPr>
   </p:defaultTextStyle>
+  <p:extLst>
+    <p:ext uri="{EFAFB233-063F-42B5-8137-9DF3F51BA10A}">
+      <p15:sldGuideLst xmlns:p15="http://schemas.microsoft.com/office/powerpoint/2012/main"/>
+    </p:ext>
+  </p:extLst>
 </p:presentation>
 </file>
 
@@ -240,7 +245,7 @@
           <a:p>
             <a:fld id="{5DF29E95-EBDD-4EEB-ADA3-5BF29B211E1A}" type="datetimeFigureOut">
               <a:rPr lang="en-US" smtClean="0"/>
-              <a:t>Wed, 11/1/17</a:t>
+              <a:t>11/1/2017</a:t>
             </a:fld>
             <a:endParaRPr lang="en-US"/>
           </a:p>
@@ -410,7 +415,7 @@
           <a:p>
             <a:fld id="{5DF29E95-EBDD-4EEB-ADA3-5BF29B211E1A}" type="datetimeFigureOut">
               <a:rPr lang="en-US" smtClean="0"/>
-              <a:t>Wed, 11/1/17</a:t>
+              <a:t>11/1/2017</a:t>
             </a:fld>
             <a:endParaRPr lang="en-US"/>
           </a:p>
@@ -590,7 +595,7 @@
           <a:p>
             <a:fld id="{5DF29E95-EBDD-4EEB-ADA3-5BF29B211E1A}" type="datetimeFigureOut">
               <a:rPr lang="en-US" smtClean="0"/>
-              <a:t>Wed, 11/1/17</a:t>
+              <a:t>11/1/2017</a:t>
             </a:fld>
             <a:endParaRPr lang="en-US"/>
           </a:p>
@@ -760,7 +765,7 @@
           <a:p>
             <a:fld id="{5DF29E95-EBDD-4EEB-ADA3-5BF29B211E1A}" type="datetimeFigureOut">
               <a:rPr lang="en-US" smtClean="0"/>
-              <a:t>Wed, 11/1/17</a:t>
+              <a:t>11/1/2017</a:t>
             </a:fld>
             <a:endParaRPr lang="en-US"/>
           </a:p>
@@ -1006,7 +1011,7 @@
           <a:p>
             <a:fld id="{5DF29E95-EBDD-4EEB-ADA3-5BF29B211E1A}" type="datetimeFigureOut">
               <a:rPr lang="en-US" smtClean="0"/>
-              <a:t>Wed, 11/1/17</a:t>
+              <a:t>11/1/2017</a:t>
             </a:fld>
             <a:endParaRPr lang="en-US"/>
           </a:p>
@@ -1238,7 +1243,7 @@
           <a:p>
             <a:fld id="{5DF29E95-EBDD-4EEB-ADA3-5BF29B211E1A}" type="datetimeFigureOut">
               <a:rPr lang="en-US" smtClean="0"/>
-              <a:t>Wed, 11/1/17</a:t>
+              <a:t>11/1/2017</a:t>
             </a:fld>
             <a:endParaRPr lang="en-US"/>
           </a:p>
@@ -1605,7 +1610,7 @@
           <a:p>
             <a:fld id="{5DF29E95-EBDD-4EEB-ADA3-5BF29B211E1A}" type="datetimeFigureOut">
               <a:rPr lang="en-US" smtClean="0"/>
-              <a:t>Wed, 11/1/17</a:t>
+              <a:t>11/1/2017</a:t>
             </a:fld>
             <a:endParaRPr lang="en-US"/>
           </a:p>
@@ -1723,7 +1728,7 @@
           <a:p>
             <a:fld id="{5DF29E95-EBDD-4EEB-ADA3-5BF29B211E1A}" type="datetimeFigureOut">
               <a:rPr lang="en-US" smtClean="0"/>
-              <a:t>Wed, 11/1/17</a:t>
+              <a:t>11/1/2017</a:t>
             </a:fld>
             <a:endParaRPr lang="en-US"/>
           </a:p>
@@ -1818,7 +1823,7 @@
           <a:p>
             <a:fld id="{5DF29E95-EBDD-4EEB-ADA3-5BF29B211E1A}" type="datetimeFigureOut">
               <a:rPr lang="en-US" smtClean="0"/>
-              <a:t>Wed, 11/1/17</a:t>
+              <a:t>11/1/2017</a:t>
             </a:fld>
             <a:endParaRPr lang="en-US"/>
           </a:p>
@@ -2095,7 +2100,7 @@
           <a:p>
             <a:fld id="{5DF29E95-EBDD-4EEB-ADA3-5BF29B211E1A}" type="datetimeFigureOut">
               <a:rPr lang="en-US" smtClean="0"/>
-              <a:t>Wed, 11/1/17</a:t>
+              <a:t>11/1/2017</a:t>
             </a:fld>
             <a:endParaRPr lang="en-US"/>
           </a:p>
@@ -2348,7 +2353,7 @@
           <a:p>
             <a:fld id="{5DF29E95-EBDD-4EEB-ADA3-5BF29B211E1A}" type="datetimeFigureOut">
               <a:rPr lang="en-US" smtClean="0"/>
-              <a:t>Wed, 11/1/17</a:t>
+              <a:t>11/1/2017</a:t>
             </a:fld>
             <a:endParaRPr lang="en-US"/>
           </a:p>
@@ -2561,7 +2566,7 @@
           <a:p>
             <a:fld id="{5DF29E95-EBDD-4EEB-ADA3-5BF29B211E1A}" type="datetimeFigureOut">
               <a:rPr lang="en-US" smtClean="0"/>
-              <a:t>Wed, 11/1/17</a:t>
+              <a:t>11/1/2017</a:t>
             </a:fld>
             <a:endParaRPr lang="en-US"/>
           </a:p>
@@ -2976,14 +2981,25 @@
             <p:ph type="title"/>
           </p:nvPr>
         </p:nvSpPr>
-        <p:spPr/>
-        <p:txBody>
-          <a:bodyPr/>
+        <p:spPr>
+          <a:xfrm>
+            <a:off x="470337" y="365125"/>
+            <a:ext cx="10515600" cy="486213"/>
+          </a:xfrm>
+        </p:spPr>
+        <p:txBody>
+          <a:bodyPr>
+            <a:normAutofit fontScale="90000"/>
+          </a:bodyPr>
           <a:lstStyle/>
           <a:p>
             <a:r>
               <a:rPr lang="en-US" dirty="0" smtClean="0"/>
-              <a:t>Automation	</a:t>
+              <a:t>Test Automation :  Strategy discussion</a:t>
+            </a:r>
+            <a:r>
+              <a:rPr lang="en-US" dirty="0" smtClean="0"/>
+              <a:t>	</a:t>
             </a:r>
             <a:endParaRPr lang="en-US" dirty="0"/>
           </a:p>
@@ -2999,36 +3015,85 @@
             <p:ph idx="1"/>
           </p:nvPr>
         </p:nvSpPr>
-        <p:spPr/>
-        <p:txBody>
-          <a:bodyPr/>
+        <p:spPr>
+          <a:xfrm>
+            <a:off x="367862" y="1219199"/>
+            <a:ext cx="10985938" cy="4957763"/>
+          </a:xfrm>
+        </p:spPr>
+        <p:txBody>
+          <a:bodyPr>
+            <a:normAutofit/>
+          </a:bodyPr>
           <a:lstStyle/>
           <a:p>
             <a:r>
               <a:rPr lang="en-US" dirty="0" smtClean="0"/>
-              <a:t>Intake Process</a:t>
-            </a:r>
+              <a:t>Intake </a:t>
+            </a:r>
+            <a:r>
+              <a:rPr lang="en-US" dirty="0" smtClean="0"/>
+              <a:t>Process:  </a:t>
+            </a:r>
+            <a:r>
+              <a:rPr lang="en-US" sz="1600" dirty="0" smtClean="0"/>
+              <a:t>How / Where do I start</a:t>
+            </a:r>
+            <a:endParaRPr lang="en-US" sz="1600" dirty="0" smtClean="0"/>
           </a:p>
           <a:p>
             <a:pPr lvl="1"/>
             <a:r>
               <a:rPr lang="en-US" dirty="0" smtClean="0"/>
-              <a:t>Manual QA</a:t>
-            </a:r>
+              <a:t>Manual </a:t>
+            </a:r>
+            <a:r>
+              <a:rPr lang="en-US" dirty="0" smtClean="0"/>
+              <a:t>QA :  </a:t>
+            </a:r>
+            <a:r>
+              <a:rPr lang="en-US" sz="1600" dirty="0" smtClean="0"/>
+              <a:t>Work done repetitively with little change</a:t>
+            </a:r>
+            <a:endParaRPr lang="en-US" sz="2000" dirty="0" smtClean="0"/>
           </a:p>
           <a:p>
             <a:pPr lvl="2"/>
             <a:r>
               <a:rPr lang="en-US" dirty="0" smtClean="0"/>
-              <a:t>Stories for Feature / Functional </a:t>
-            </a:r>
+              <a:t>Stories </a:t>
+            </a:r>
+            <a:r>
+              <a:rPr lang="en-US" dirty="0" smtClean="0"/>
+              <a:t>of feature defined functionality </a:t>
+            </a:r>
+            <a:endParaRPr lang="en-US" dirty="0" smtClean="0"/>
           </a:p>
           <a:p>
             <a:pPr lvl="2"/>
             <a:r>
               <a:rPr lang="en-US" dirty="0" smtClean="0"/>
-              <a:t>Test Scenarios  for end 2 end features</a:t>
-            </a:r>
+              <a:t>Combinations of feature functions making up user </a:t>
+            </a:r>
+            <a:r>
+              <a:rPr lang="en-US" dirty="0" smtClean="0"/>
+              <a:t>work flows</a:t>
+            </a:r>
+          </a:p>
+          <a:p>
+            <a:pPr lvl="2"/>
+            <a:r>
+              <a:rPr lang="en-US" dirty="0" smtClean="0"/>
+              <a:t>The specifics of a work flows define test scenarios  </a:t>
+            </a:r>
+          </a:p>
+          <a:p>
+            <a:pPr lvl="2"/>
+            <a:r>
+              <a:rPr lang="en-US" dirty="0" smtClean="0"/>
+              <a:t>Ultimately there is a Global workflow across all 4 or 5 pages culminating in a sale (B&amp;A)</a:t>
+            </a:r>
+            <a:endParaRPr lang="en-US" dirty="0" smtClean="0"/>
           </a:p>
           <a:p>
             <a:pPr marL="914400" lvl="2" indent="0">
@@ -3037,24 +3102,46 @@
             <a:endParaRPr lang="en-US" dirty="0" smtClean="0"/>
           </a:p>
           <a:p>
+            <a:r>
+              <a:rPr lang="en-US" dirty="0" smtClean="0"/>
+              <a:t>Two Primary areas of test</a:t>
+            </a:r>
+          </a:p>
+          <a:p>
             <a:pPr lvl="1"/>
             <a:r>
               <a:rPr lang="en-US" dirty="0" smtClean="0"/>
-              <a:t>API</a:t>
-            </a:r>
-          </a:p>
-          <a:p>
+              <a:t>Data Source API’s:  </a:t>
+            </a:r>
+            <a:r>
+              <a:rPr lang="en-US" sz="1800" dirty="0" smtClean="0"/>
+              <a:t>Supported by </a:t>
+            </a:r>
+            <a:r>
+              <a:rPr lang="en-US" sz="1800" dirty="0" err="1" smtClean="0"/>
+              <a:t>microservices</a:t>
+            </a:r>
+            <a:endParaRPr lang="en-US" sz="1800" dirty="0" smtClean="0"/>
+          </a:p>
+          <a:p>
+            <a:pPr lvl="1"/>
             <a:r>
               <a:rPr lang="en-US" dirty="0" smtClean="0"/>
-              <a:t>&lt; </a:t>
-            </a:r>
-          </a:p>
-          <a:p>
-            <a:pPr lvl="1"/>
-            <a:r>
-              <a:rPr lang="en-US" dirty="0" smtClean="0"/>
-              <a:t>Product Lines</a:t>
-            </a:r>
+              <a:t>Product Lines:  </a:t>
+            </a:r>
+            <a:r>
+              <a:rPr lang="en-US" sz="1800" dirty="0" smtClean="0"/>
+              <a:t>Consumer of data : B&amp;A, PD, PM( </a:t>
+            </a:r>
+            <a:r>
+              <a:rPr lang="en-US" sz="1800" dirty="0" err="1" smtClean="0"/>
+              <a:t>unstarted</a:t>
+            </a:r>
+            <a:r>
+              <a:rPr lang="en-US" sz="1800" dirty="0" smtClean="0"/>
+              <a:t> )</a:t>
+            </a:r>
+            <a:endParaRPr lang="en-US" sz="1800" dirty="0" smtClean="0"/>
           </a:p>
           <a:p>
             <a:pPr marL="457200" lvl="1" indent="0">
@@ -3102,25 +3189,6 @@
       </p:grpSpPr>
       <p:sp>
         <p:nvSpPr>
-          <p:cNvPr id="2" name="Title 1"/>
-          <p:cNvSpPr>
-            <a:spLocks noGrp="1"/>
-          </p:cNvSpPr>
-          <p:nvPr>
-            <p:ph type="title"/>
-          </p:nvPr>
-        </p:nvSpPr>
-        <p:spPr/>
-        <p:txBody>
-          <a:bodyPr/>
-          <a:lstStyle/>
-          <a:p>
-            <a:endParaRPr lang="en-US"/>
-          </a:p>
-        </p:txBody>
-      </p:sp>
-      <p:sp>
-        <p:nvSpPr>
           <p:cNvPr id="3" name="Content Placeholder 2"/>
           <p:cNvSpPr>
             <a:spLocks noGrp="1"/>
@@ -3129,7 +3197,12 @@
             <p:ph idx="1"/>
           </p:nvPr>
         </p:nvSpPr>
-        <p:spPr/>
+        <p:spPr>
+          <a:xfrm>
+            <a:off x="838200" y="756745"/>
+            <a:ext cx="10515600" cy="5399198"/>
+          </a:xfrm>
+        </p:spPr>
         <p:txBody>
           <a:bodyPr/>
           <a:lstStyle/>
@@ -3140,77 +3213,150 @@
             </a:r>
           </a:p>
           <a:p>
-            <a:pPr lvl="1"/>
+            <a:pPr lvl="1">
+              <a:lnSpc>
+                <a:spcPct val="130000"/>
+              </a:lnSpc>
+            </a:pPr>
             <a:r>
               <a:rPr lang="en-US" dirty="0" smtClean="0"/>
-              <a:t>Smoke / Acceptance</a:t>
-            </a:r>
-          </a:p>
-          <a:p>
-            <a:pPr lvl="1"/>
+              <a:t>Smoke </a:t>
+            </a:r>
             <a:r>
               <a:rPr lang="en-US" dirty="0" smtClean="0"/>
-              <a:t>Functional Feature</a:t>
-            </a:r>
-          </a:p>
-          <a:p>
-            <a:pPr lvl="1"/>
+              <a:t>/ </a:t>
+            </a:r>
             <a:r>
               <a:rPr lang="en-US" dirty="0" smtClean="0"/>
-              <a:t>Page level Unit</a:t>
-            </a:r>
-          </a:p>
-          <a:p>
-            <a:pPr lvl="1"/>
+              <a:t>Acceptance:   </a:t>
+            </a:r>
+            <a:r>
+              <a:rPr lang="en-US" sz="2000" dirty="0" smtClean="0"/>
+              <a:t>Focused feature areas, quick, can continue</a:t>
+            </a:r>
+            <a:endParaRPr lang="en-US" sz="1800" dirty="0" smtClean="0"/>
+          </a:p>
+          <a:p>
+            <a:pPr lvl="1">
+              <a:lnSpc>
+                <a:spcPct val="130000"/>
+              </a:lnSpc>
+            </a:pPr>
             <a:r>
               <a:rPr lang="en-US" dirty="0" smtClean="0"/>
-              <a:t>End to end Work flow</a:t>
-            </a:r>
+              <a:t>Functional </a:t>
+            </a:r>
+            <a:r>
+              <a:rPr lang="en-US" dirty="0" smtClean="0"/>
+              <a:t>Feature :   </a:t>
+            </a:r>
+            <a:r>
+              <a:rPr lang="en-US" sz="2000" dirty="0" smtClean="0"/>
+              <a:t>Newly developed functionality validated usable</a:t>
+            </a:r>
+            <a:endParaRPr lang="en-US" sz="2000" dirty="0" smtClean="0"/>
+          </a:p>
+          <a:p>
+            <a:pPr lvl="1">
+              <a:lnSpc>
+                <a:spcPct val="130000"/>
+              </a:lnSpc>
+            </a:pPr>
+            <a:r>
+              <a:rPr lang="en-US" dirty="0" smtClean="0"/>
+              <a:t>Page level </a:t>
+            </a:r>
+            <a:r>
+              <a:rPr lang="en-US" dirty="0" smtClean="0"/>
+              <a:t>Unit : </a:t>
+            </a:r>
+            <a:r>
+              <a:rPr lang="en-US" sz="2000" dirty="0" smtClean="0"/>
+              <a:t>Page level layout &amp; operation, early work</a:t>
+            </a:r>
+            <a:endParaRPr lang="en-US" dirty="0" smtClean="0"/>
+          </a:p>
+          <a:p>
+            <a:pPr lvl="1">
+              <a:lnSpc>
+                <a:spcPct val="130000"/>
+              </a:lnSpc>
+            </a:pPr>
+            <a:r>
+              <a:rPr lang="en-US" dirty="0" smtClean="0"/>
+              <a:t>End to end Work </a:t>
+            </a:r>
+            <a:r>
+              <a:rPr lang="en-US" dirty="0" smtClean="0"/>
+              <a:t>flow : </a:t>
+            </a:r>
+            <a:r>
+              <a:rPr lang="en-US" sz="2000" dirty="0" smtClean="0"/>
+              <a:t>Usability validation, business case </a:t>
+            </a:r>
+            <a:r>
+              <a:rPr lang="en-US" sz="2000" dirty="0" err="1" smtClean="0"/>
+              <a:t>vaildation</a:t>
+            </a:r>
+            <a:endParaRPr lang="en-US" dirty="0" smtClean="0"/>
           </a:p>
           <a:p>
             <a:pPr lvl="1"/>
             <a:endParaRPr lang="en-US" dirty="0"/>
           </a:p>
           <a:p>
-            <a:pPr marL="0" indent="0">
-              <a:buNone/>
-            </a:pPr>
             <a:r>
               <a:rPr lang="en-US" dirty="0" smtClean="0"/>
               <a:t>Execution</a:t>
             </a:r>
           </a:p>
           <a:p>
-            <a:pPr marL="0" indent="0">
-              <a:buNone/>
+            <a:pPr lvl="1">
+              <a:lnSpc>
+                <a:spcPct val="130000"/>
+              </a:lnSpc>
             </a:pPr>
             <a:r>
-              <a:rPr lang="en-US" dirty="0"/>
-              <a:t>	</a:t>
-            </a:r>
-            <a:r>
-              <a:rPr lang="en-US" sz="2400" dirty="0" smtClean="0"/>
-              <a:t>Clock based </a:t>
-            </a:r>
-            <a:r>
-              <a:rPr lang="en-US" sz="2400" dirty="0" err="1" smtClean="0"/>
-              <a:t>Regressiontesting</a:t>
-            </a:r>
-            <a:endParaRPr lang="en-US" sz="2400" dirty="0" smtClean="0"/>
-          </a:p>
-          <a:p>
-            <a:pPr marL="0" indent="0">
-              <a:buNone/>
+              <a:rPr lang="en-US" dirty="0" smtClean="0"/>
+              <a:t>Clock based :  </a:t>
+            </a:r>
+            <a:r>
+              <a:rPr lang="en-US" sz="1800" dirty="0" smtClean="0"/>
+              <a:t>Regression testing:  MOT tested every four hours</a:t>
+            </a:r>
+            <a:endParaRPr lang="en-US" dirty="0" smtClean="0"/>
+          </a:p>
+          <a:p>
+            <a:pPr lvl="1">
+              <a:lnSpc>
+                <a:spcPct val="130000"/>
+              </a:lnSpc>
             </a:pPr>
             <a:r>
-              <a:rPr lang="en-US" sz="2400" dirty="0"/>
-              <a:t>	</a:t>
-            </a:r>
-            <a:r>
-              <a:rPr lang="en-US" sz="2400" dirty="0" smtClean="0"/>
-              <a:t>Functional Feature test Jenkins on a build</a:t>
-            </a:r>
-            <a:endParaRPr lang="en-US" sz="2400" dirty="0"/>
+              <a:rPr lang="en-US" dirty="0" smtClean="0"/>
+              <a:t>Functional </a:t>
+            </a:r>
+            <a:r>
+              <a:rPr lang="en-US" dirty="0" smtClean="0"/>
+              <a:t>Feature test Jenkins on a </a:t>
+            </a:r>
+            <a:r>
+              <a:rPr lang="en-US" dirty="0" smtClean="0"/>
+              <a:t>build : </a:t>
+            </a:r>
+            <a:r>
+              <a:rPr lang="en-US" sz="1800" dirty="0" smtClean="0"/>
+              <a:t>AWS DIT </a:t>
+            </a:r>
+            <a:r>
+              <a:rPr lang="en-US" sz="1800" dirty="0" err="1" smtClean="0"/>
+              <a:t>Const</a:t>
+            </a:r>
+            <a:r>
+              <a:rPr lang="en-US" sz="1800" dirty="0" smtClean="0"/>
+              <a:t> Integration Jenkins Lead</a:t>
+            </a:r>
+            <a:endParaRPr lang="en-US" dirty="0"/>
           </a:p>
         </p:txBody>
       </p:sp>
@@ -3254,14 +3400,43 @@
             <p:ph type="title"/>
           </p:nvPr>
         </p:nvSpPr>
-        <p:spPr/>
+        <p:spPr>
+          <a:xfrm>
+            <a:off x="838200" y="365126"/>
+            <a:ext cx="10515600" cy="822544"/>
+          </a:xfrm>
+        </p:spPr>
         <p:txBody>
           <a:bodyPr/>
           <a:lstStyle/>
           <a:p>
             <a:r>
               <a:rPr lang="en-US" dirty="0" smtClean="0"/>
-              <a:t>Vision	:  Minimal Manual	</a:t>
+              <a:t>Vision : </a:t>
+            </a:r>
+            <a:r>
+              <a:rPr lang="en-US" sz="3600" dirty="0" smtClean="0"/>
+              <a:t>Minimal </a:t>
+            </a:r>
+            <a:r>
+              <a:rPr lang="en-US" sz="3600" dirty="0" smtClean="0"/>
+              <a:t>Manual</a:t>
+            </a:r>
+            <a:r>
+              <a:rPr lang="en-US" sz="3600" dirty="0"/>
+              <a:t> </a:t>
+            </a:r>
+            <a:r>
+              <a:rPr lang="en-US" sz="3600" dirty="0" smtClean="0"/>
+              <a:t>– Better Reporting </a:t>
+            </a:r>
+            <a:r>
+              <a:rPr lang="en-US" sz="3600" dirty="0" err="1" smtClean="0"/>
+              <a:t>stastics</a:t>
+            </a:r>
+            <a:r>
+              <a:rPr lang="en-US" sz="3600" dirty="0" smtClean="0"/>
+              <a:t> </a:t>
             </a:r>
             <a:endParaRPr lang="en-US" dirty="0"/>
           </a:p>
@@ -3287,8 +3462,8 @@
               <a:t>How do we get </a:t>
             </a:r>
             <a:r>
-              <a:rPr lang="en-US" dirty="0" err="1" smtClean="0"/>
-              <a:t>ther</a:t>
+              <a:rPr lang="en-US" dirty="0" smtClean="0"/>
+              <a:t>there</a:t>
             </a:r>
             <a:endParaRPr lang="en-US" dirty="0" smtClean="0"/>
           </a:p>
@@ -3298,13 +3473,9 @@
           <a:p>
             <a:r>
               <a:rPr lang="en-US" dirty="0" smtClean="0"/>
-              <a:t>What am I doing to </a:t>
-            </a:r>
-            <a:r>
-              <a:rPr lang="en-US" smtClean="0"/>
-              <a:t>get there.</a:t>
-            </a:r>
-            <a:endParaRPr lang="en-US"/>
+              <a:t>What am I doing to get there.</a:t>
+            </a:r>
+            <a:endParaRPr lang="en-US" dirty="0"/>
           </a:p>
         </p:txBody>
       </p:sp>

</xml_diff>

<commit_message>
11/6/17 edit mods and other files
</commit_message>
<xml_diff>
--- a/2017AutomationStrategy.pptx
+++ b/2017AutomationStrategy.pptx
@@ -8,7 +8,8 @@
     <p:sldId id="257" r:id="rId2"/>
     <p:sldId id="258" r:id="rId3"/>
     <p:sldId id="259" r:id="rId4"/>
-    <p:sldId id="260" r:id="rId5"/>
+    <p:sldId id="261" r:id="rId5"/>
+    <p:sldId id="260" r:id="rId6"/>
   </p:sldIdLst>
   <p:sldSz cx="12192000" cy="6858000"/>
   <p:notesSz cx="6858000" cy="9144000"/>
@@ -246,7 +247,7 @@
           <a:p>
             <a:fld id="{5DF29E95-EBDD-4EEB-ADA3-5BF29B211E1A}" type="datetimeFigureOut">
               <a:rPr lang="en-US" smtClean="0"/>
-              <a:t>11/2/2017</a:t>
+              <a:t>Mon, 11/6/17</a:t>
             </a:fld>
             <a:endParaRPr lang="en-US"/>
           </a:p>
@@ -416,7 +417,7 @@
           <a:p>
             <a:fld id="{5DF29E95-EBDD-4EEB-ADA3-5BF29B211E1A}" type="datetimeFigureOut">
               <a:rPr lang="en-US" smtClean="0"/>
-              <a:t>11/2/2017</a:t>
+              <a:t>Mon, 11/6/17</a:t>
             </a:fld>
             <a:endParaRPr lang="en-US"/>
           </a:p>
@@ -596,7 +597,7 @@
           <a:p>
             <a:fld id="{5DF29E95-EBDD-4EEB-ADA3-5BF29B211E1A}" type="datetimeFigureOut">
               <a:rPr lang="en-US" smtClean="0"/>
-              <a:t>11/2/2017</a:t>
+              <a:t>Mon, 11/6/17</a:t>
             </a:fld>
             <a:endParaRPr lang="en-US"/>
           </a:p>
@@ -766,7 +767,7 @@
           <a:p>
             <a:fld id="{5DF29E95-EBDD-4EEB-ADA3-5BF29B211E1A}" type="datetimeFigureOut">
               <a:rPr lang="en-US" smtClean="0"/>
-              <a:t>11/2/2017</a:t>
+              <a:t>Mon, 11/6/17</a:t>
             </a:fld>
             <a:endParaRPr lang="en-US"/>
           </a:p>
@@ -1012,7 +1013,7 @@
           <a:p>
             <a:fld id="{5DF29E95-EBDD-4EEB-ADA3-5BF29B211E1A}" type="datetimeFigureOut">
               <a:rPr lang="en-US" smtClean="0"/>
-              <a:t>11/2/2017</a:t>
+              <a:t>Mon, 11/6/17</a:t>
             </a:fld>
             <a:endParaRPr lang="en-US"/>
           </a:p>
@@ -1244,7 +1245,7 @@
           <a:p>
             <a:fld id="{5DF29E95-EBDD-4EEB-ADA3-5BF29B211E1A}" type="datetimeFigureOut">
               <a:rPr lang="en-US" smtClean="0"/>
-              <a:t>11/2/2017</a:t>
+              <a:t>Mon, 11/6/17</a:t>
             </a:fld>
             <a:endParaRPr lang="en-US"/>
           </a:p>
@@ -1611,7 +1612,7 @@
           <a:p>
             <a:fld id="{5DF29E95-EBDD-4EEB-ADA3-5BF29B211E1A}" type="datetimeFigureOut">
               <a:rPr lang="en-US" smtClean="0"/>
-              <a:t>11/2/2017</a:t>
+              <a:t>Mon, 11/6/17</a:t>
             </a:fld>
             <a:endParaRPr lang="en-US"/>
           </a:p>
@@ -1729,7 +1730,7 @@
           <a:p>
             <a:fld id="{5DF29E95-EBDD-4EEB-ADA3-5BF29B211E1A}" type="datetimeFigureOut">
               <a:rPr lang="en-US" smtClean="0"/>
-              <a:t>11/2/2017</a:t>
+              <a:t>Mon, 11/6/17</a:t>
             </a:fld>
             <a:endParaRPr lang="en-US"/>
           </a:p>
@@ -1824,7 +1825,7 @@
           <a:p>
             <a:fld id="{5DF29E95-EBDD-4EEB-ADA3-5BF29B211E1A}" type="datetimeFigureOut">
               <a:rPr lang="en-US" smtClean="0"/>
-              <a:t>11/2/2017</a:t>
+              <a:t>Mon, 11/6/17</a:t>
             </a:fld>
             <a:endParaRPr lang="en-US"/>
           </a:p>
@@ -2101,7 +2102,7 @@
           <a:p>
             <a:fld id="{5DF29E95-EBDD-4EEB-ADA3-5BF29B211E1A}" type="datetimeFigureOut">
               <a:rPr lang="en-US" smtClean="0"/>
-              <a:t>11/2/2017</a:t>
+              <a:t>Mon, 11/6/17</a:t>
             </a:fld>
             <a:endParaRPr lang="en-US"/>
           </a:p>
@@ -2354,7 +2355,7 @@
           <a:p>
             <a:fld id="{5DF29E95-EBDD-4EEB-ADA3-5BF29B211E1A}" type="datetimeFigureOut">
               <a:rPr lang="en-US" smtClean="0"/>
-              <a:t>11/2/2017</a:t>
+              <a:t>Mon, 11/6/17</a:t>
             </a:fld>
             <a:endParaRPr lang="en-US"/>
           </a:p>
@@ -2567,7 +2568,7 @@
           <a:p>
             <a:fld id="{5DF29E95-EBDD-4EEB-ADA3-5BF29B211E1A}" type="datetimeFigureOut">
               <a:rPr lang="en-US" smtClean="0"/>
-              <a:t>11/2/2017</a:t>
+              <a:t>Mon, 11/6/17</a:t>
             </a:fld>
             <a:endParaRPr lang="en-US"/>
           </a:p>
@@ -3201,7 +3202,19 @@
             </a:r>
             <a:r>
               <a:rPr lang="en-US" sz="2000" dirty="0" smtClean="0"/>
-              <a:t>Focused feature areas, quick, can continue</a:t>
+              <a:t>Focused feature areas, </a:t>
+            </a:r>
+            <a:r>
+              <a:rPr lang="en-US" sz="2000" dirty="0" smtClean="0"/>
+              <a:t>quick</a:t>
+            </a:r>
+            <a:r>
+              <a:rPr lang="en-US" sz="2000" dirty="0" smtClean="0"/>
+              <a:t>.   :   Should I </a:t>
+            </a:r>
+            <a:r>
+              <a:rPr lang="en-US" sz="2000" dirty="0" smtClean="0"/>
+              <a:t>continue ?</a:t>
             </a:r>
             <a:endParaRPr lang="en-US" sz="1800" dirty="0" smtClean="0"/>
           </a:p>
@@ -3217,8 +3230,21 @@
             </a:r>
             <a:r>
               <a:rPr lang="en-US" sz="2000" dirty="0" smtClean="0"/>
-              <a:t>Newly developed functionality validated usable</a:t>
-            </a:r>
+              <a:t>Newly developed </a:t>
+            </a:r>
+            <a:r>
+              <a:rPr lang="en-US" sz="2000" dirty="0" smtClean="0"/>
+              <a:t>functionality   :   </a:t>
+            </a:r>
+            <a:r>
+              <a:rPr lang="en-US" sz="2000" dirty="0" smtClean="0"/>
+              <a:t>V</a:t>
+            </a:r>
+            <a:r>
+              <a:rPr lang="en-US" sz="2000" dirty="0" smtClean="0"/>
+              <a:t>alidated usable  ?</a:t>
+            </a:r>
+            <a:endParaRPr lang="en-US" sz="2000" dirty="0" smtClean="0"/>
           </a:p>
           <a:p>
             <a:pPr lvl="1">
@@ -3251,8 +3277,8 @@
               <a:t>Usability validation, business case </a:t>
             </a:r>
             <a:r>
-              <a:rPr lang="en-US" sz="2000" dirty="0" err="1" smtClean="0"/>
-              <a:t>vaildation</a:t>
+              <a:rPr lang="en-US" sz="2000" dirty="0" smtClean="0"/>
+              <a:t>validation </a:t>
             </a:r>
             <a:endParaRPr lang="en-US" dirty="0" smtClean="0"/>
           </a:p>
@@ -3375,12 +3401,8 @@
               <a:t>– Better Reporting </a:t>
             </a:r>
             <a:r>
-              <a:rPr lang="en-US" sz="3600" dirty="0" err="1" smtClean="0"/>
-              <a:t>stastics</a:t>
-            </a:r>
-            <a:r>
               <a:rPr lang="en-US" sz="3600" dirty="0" smtClean="0"/>
-              <a:t> </a:t>
+              <a:t>statistics </a:t>
             </a:r>
             <a:endParaRPr lang="en-US" dirty="0"/>
           </a:p>
@@ -3398,13 +3420,13 @@
         </p:nvSpPr>
         <p:spPr>
           <a:xfrm>
-            <a:off x="838200" y="1187670"/>
-            <a:ext cx="10515600" cy="4989293"/>
+            <a:off x="324853" y="1187670"/>
+            <a:ext cx="11028947" cy="4989293"/>
           </a:xfrm>
         </p:spPr>
         <p:txBody>
           <a:bodyPr>
-            <a:normAutofit fontScale="62500" lnSpcReduction="20000"/>
+            <a:normAutofit fontScale="55000" lnSpcReduction="20000"/>
           </a:bodyPr>
           <a:lstStyle/>
           <a:p>
@@ -3413,12 +3435,12 @@
               <a:t>Goal: </a:t>
             </a:r>
             <a:r>
-              <a:rPr lang="en-US" dirty="0" err="1" smtClean="0"/>
-              <a:t>Severly</a:t>
-            </a:r>
-            <a:r>
-              <a:rPr lang="en-US" dirty="0" smtClean="0"/>
-              <a:t> reduce the manual effort</a:t>
+              <a:rPr lang="en-US" dirty="0" smtClean="0"/>
+              <a:t>Severely </a:t>
+            </a:r>
+            <a:r>
+              <a:rPr lang="en-US" dirty="0" smtClean="0"/>
+              <a:t>reduce the manual effort</a:t>
             </a:r>
           </a:p>
           <a:p>
@@ -3427,19 +3449,21 @@
               <a:rPr lang="en-US" dirty="0" smtClean="0"/>
               <a:t>Will require a currently unknown technique / process that will enable improved developed to automated time cycle</a:t>
             </a:r>
-            <a:endParaRPr lang="en-US" dirty="0" smtClean="0"/>
-          </a:p>
-          <a:p>
-            <a:endParaRPr lang="en-US" dirty="0"/>
-          </a:p>
-          <a:p>
-            <a:r>
-              <a:rPr lang="en-US" dirty="0" smtClean="0"/>
-              <a:t>How </a:t>
-            </a:r>
-            <a:r>
-              <a:rPr lang="en-US" dirty="0" smtClean="0"/>
-              <a:t>do we get there</a:t>
+          </a:p>
+          <a:p>
+            <a:pPr marL="0" indent="0">
+              <a:buNone/>
+            </a:pPr>
+            <a:r>
+              <a:rPr lang="en-US" sz="1100" dirty="0" smtClean="0"/>
+              <a:t>        </a:t>
+            </a:r>
+            <a:endParaRPr lang="en-US" sz="1100" dirty="0"/>
+          </a:p>
+          <a:p>
+            <a:r>
+              <a:rPr lang="en-US" dirty="0" smtClean="0"/>
+              <a:t>How do we get there</a:t>
             </a:r>
           </a:p>
           <a:p>
@@ -3465,11 +3489,7 @@
           <a:p>
             <a:r>
               <a:rPr lang="en-US" dirty="0" smtClean="0"/>
-              <a:t>What am I doing to get </a:t>
-            </a:r>
-            <a:r>
-              <a:rPr lang="en-US" dirty="0" smtClean="0"/>
-              <a:t>there</a:t>
+              <a:t>What am I doing to get there</a:t>
             </a:r>
           </a:p>
           <a:p>
@@ -3481,30 +3501,69 @@
             <a:endParaRPr lang="en-US" dirty="0"/>
           </a:p>
           <a:p>
+            <a:r>
+              <a:rPr lang="en-US" dirty="0" smtClean="0"/>
+              <a:t>Test on Mobile </a:t>
+            </a:r>
+            <a:r>
+              <a:rPr lang="en-US" dirty="0"/>
+              <a:t>devices (</a:t>
+            </a:r>
+            <a:r>
+              <a:rPr lang="en-US" sz="1800" dirty="0"/>
+              <a:t>Want to work towards mobile device test automation.  Either emulated or actually on device.  Need to do some research about industry best practices.</a:t>
+            </a:r>
+            <a:r>
+              <a:rPr lang="en-US" dirty="0"/>
+              <a:t>  </a:t>
+            </a:r>
+            <a:r>
+              <a:rPr lang="en-US" dirty="0" smtClean="0"/>
+              <a:t> )</a:t>
+            </a:r>
             <a:endParaRPr lang="en-US" dirty="0" smtClean="0"/>
           </a:p>
           <a:p>
             <a:r>
               <a:rPr lang="en-US" dirty="0" smtClean="0"/>
-              <a:t>Record all test parameters</a:t>
-            </a:r>
-          </a:p>
-          <a:p>
-            <a:r>
-              <a:rPr lang="en-US" dirty="0" smtClean="0"/>
-              <a:t>Load a database</a:t>
-            </a:r>
-          </a:p>
-          <a:p>
-            <a:r>
-              <a:rPr lang="en-US" dirty="0" smtClean="0"/>
-              <a:t>Be able to query or report on</a:t>
+              <a:t>Record all test </a:t>
+            </a:r>
+            <a:r>
+              <a:rPr lang="en-US" dirty="0" smtClean="0"/>
+              <a:t>parameters in a test reporting Database</a:t>
+            </a:r>
+          </a:p>
+          <a:p>
+            <a:r>
+              <a:rPr lang="en-US" dirty="0" smtClean="0"/>
+              <a:t>Enable queries on</a:t>
             </a:r>
           </a:p>
           <a:p>
             <a:pPr lvl="1"/>
             <a:r>
               <a:rPr lang="en-US" dirty="0" smtClean="0"/>
+              <a:t>Test duration over time</a:t>
+            </a:r>
+          </a:p>
+          <a:p>
+            <a:pPr lvl="2"/>
+            <a:r>
+              <a:rPr lang="en-US" dirty="0" smtClean="0"/>
+              <a:t>How long a suite of tests takes</a:t>
+            </a:r>
+          </a:p>
+          <a:p>
+            <a:pPr lvl="2"/>
+            <a:r>
+              <a:rPr lang="en-US" dirty="0" smtClean="0"/>
+              <a:t>How long a specific test takes</a:t>
+            </a:r>
+          </a:p>
+          <a:p>
+            <a:pPr lvl="1"/>
+            <a:r>
+              <a:rPr lang="en-US" dirty="0" smtClean="0"/>
               <a:t>Test duration average longest shortest</a:t>
             </a:r>
           </a:p>
@@ -3512,29 +3571,53 @@
             <a:pPr lvl="1"/>
             <a:r>
               <a:rPr lang="en-US" dirty="0" smtClean="0"/>
-              <a:t>Test run duration</a:t>
-            </a:r>
+              <a:t>Test </a:t>
+            </a:r>
+            <a:r>
+              <a:rPr lang="en-US" dirty="0" smtClean="0"/>
+              <a:t>run </a:t>
+            </a:r>
+            <a:r>
+              <a:rPr lang="en-US" dirty="0" smtClean="0"/>
+              <a:t>duration difference between servers</a:t>
+            </a:r>
+            <a:endParaRPr lang="en-US" dirty="0" smtClean="0"/>
           </a:p>
           <a:p>
             <a:pPr lvl="1"/>
             <a:r>
               <a:rPr lang="en-US" dirty="0" smtClean="0"/>
-              <a:t>Test numbers</a:t>
-            </a:r>
+              <a:t>Count of </a:t>
+            </a:r>
+            <a:r>
+              <a:rPr lang="en-US" dirty="0" smtClean="0"/>
+              <a:t>Tests:  Historical views </a:t>
+            </a:r>
+            <a:endParaRPr lang="en-US" dirty="0" smtClean="0"/>
           </a:p>
           <a:p>
             <a:pPr lvl="1"/>
             <a:r>
               <a:rPr lang="en-US" dirty="0" smtClean="0"/>
-              <a:t>Test passes</a:t>
-            </a:r>
+              <a:t>Test </a:t>
+            </a:r>
+            <a:r>
+              <a:rPr lang="en-US" dirty="0" smtClean="0"/>
+              <a:t>passes:  Historical views</a:t>
+            </a:r>
+            <a:endParaRPr lang="en-US" dirty="0" smtClean="0"/>
           </a:p>
           <a:p>
             <a:pPr lvl="1"/>
             <a:r>
               <a:rPr lang="en-US" dirty="0" smtClean="0"/>
-              <a:t>Test fails</a:t>
-            </a:r>
+              <a:t>Test </a:t>
+            </a:r>
+            <a:r>
+              <a:rPr lang="en-US" dirty="0" smtClean="0"/>
+              <a:t>fails : Historical views</a:t>
+            </a:r>
+            <a:endParaRPr lang="en-US" dirty="0" smtClean="0"/>
           </a:p>
           <a:p>
             <a:pPr lvl="1"/>
@@ -3544,11 +3627,10 @@
             </a:r>
           </a:p>
           <a:p>
-            <a:pPr lvl="1"/>
-            <a:r>
-              <a:rPr lang="en-US" dirty="0" smtClean="0"/>
-              <a:t>.</a:t>
-            </a:r>
+            <a:pPr marL="457200" lvl="1" indent="0">
+              <a:buNone/>
+            </a:pPr>
+            <a:endParaRPr lang="en-US" dirty="0" smtClean="0"/>
           </a:p>
           <a:p>
             <a:endParaRPr lang="en-US" dirty="0"/>
@@ -3591,24 +3673,125 @@
           <a:chExt cx="0" cy="0"/>
         </a:xfrm>
       </p:grpSpPr>
+      <p:sp>
+        <p:nvSpPr>
+          <p:cNvPr id="3" name="Rectangle 2"/>
+          <p:cNvSpPr/>
+          <p:nvPr/>
+        </p:nvSpPr>
+        <p:spPr>
+          <a:xfrm>
+            <a:off x="372979" y="212095"/>
+            <a:ext cx="11189367" cy="3139321"/>
+          </a:xfrm>
+          <a:prstGeom prst="rect">
+            <a:avLst/>
+          </a:prstGeom>
+        </p:spPr>
+        <p:txBody>
+          <a:bodyPr wrap="square">
+            <a:spAutoFit/>
+          </a:bodyPr>
+          <a:lstStyle/>
+          <a:p>
+            <a:endParaRPr lang="en-US" dirty="0" smtClean="0"/>
+          </a:p>
+          <a:p>
+            <a:r>
+              <a:rPr lang="en-US" dirty="0" smtClean="0"/>
+              <a:t>We </a:t>
+            </a:r>
+            <a:r>
+              <a:rPr lang="en-US" dirty="0"/>
+              <a:t>plan to </a:t>
+            </a:r>
+            <a:r>
+              <a:rPr lang="en-US" dirty="0" smtClean="0"/>
+              <a:t>capture Command </a:t>
+            </a:r>
+            <a:r>
+              <a:rPr lang="en-US" dirty="0"/>
+              <a:t>line that calls the test. </a:t>
+            </a:r>
+            <a:endParaRPr lang="en-US" dirty="0" smtClean="0"/>
+          </a:p>
+          <a:p>
+            <a:r>
+              <a:rPr lang="en-US" dirty="0" smtClean="0"/>
+              <a:t>The </a:t>
+            </a:r>
+            <a:r>
+              <a:rPr lang="en-US" dirty="0"/>
+              <a:t>server tested against, the server tested </a:t>
+            </a:r>
+            <a:r>
+              <a:rPr lang="en-US" dirty="0" smtClean="0"/>
+              <a:t>from.  The  average </a:t>
+            </a:r>
+            <a:r>
+              <a:rPr lang="en-US" dirty="0"/>
+              <a:t>ping test server to app server</a:t>
+            </a:r>
+          </a:p>
+          <a:p>
+            <a:r>
+              <a:rPr lang="en-US" dirty="0"/>
+              <a:t>Browser, browser </a:t>
+            </a:r>
+            <a:r>
+              <a:rPr lang="en-US" dirty="0" smtClean="0"/>
+              <a:t>version</a:t>
+            </a:r>
+          </a:p>
+          <a:p>
+            <a:endParaRPr lang="en-US" dirty="0"/>
+          </a:p>
+          <a:p>
+            <a:endParaRPr lang="en-US" dirty="0"/>
+          </a:p>
+          <a:p>
+            <a:r>
+              <a:rPr lang="en-US" dirty="0"/>
+              <a:t>A test run captures and calculates.  </a:t>
+            </a:r>
+          </a:p>
+          <a:p>
+            <a:r>
+              <a:rPr lang="en-US" dirty="0"/>
+              <a:t>Run: number of tests, passes, failures, Duration of the tests in the run summed up.</a:t>
+            </a:r>
+          </a:p>
+          <a:p>
+            <a:r>
+              <a:rPr lang="en-US" dirty="0"/>
+              <a:t>An individual test captures Feature Story it belongs to , pass/fail, test duration, Failure notification</a:t>
+            </a:r>
+          </a:p>
+          <a:p>
+            <a:endParaRPr lang="en-US" dirty="0"/>
+          </a:p>
+          <a:p>
+            <a:endParaRPr lang="en-US" dirty="0"/>
+          </a:p>
+        </p:txBody>
+      </p:sp>
       <p:graphicFrame>
         <p:nvGraphicFramePr>
-          <p:cNvPr id="4" name="Content Placeholder 3"/>
+          <p:cNvPr id="5" name="Content Placeholder 3"/>
           <p:cNvGraphicFramePr>
-            <a:graphicFrameLocks noGrp="1"/>
+            <a:graphicFrameLocks/>
           </p:cNvGraphicFramePr>
           <p:nvPr>
-            <p:ph idx="4294967295"/>
             <p:extLst>
               <p:ext uri="{D42A27DB-BD31-4B8C-83A1-F6EECF244321}">
-                <p14:modId xmlns:p14="http://schemas.microsoft.com/office/powerpoint/2010/main" val="1351181834"/>
+                <p14:modId xmlns:p14="http://schemas.microsoft.com/office/powerpoint/2010/main" val="915892855"/>
               </p:ext>
             </p:extLst>
           </p:nvPr>
         </p:nvGraphicFramePr>
         <p:xfrm>
-          <a:off x="210207" y="377716"/>
-          <a:ext cx="11259208" cy="1923394"/>
+          <a:off x="186143" y="3681664"/>
+          <a:ext cx="11259208" cy="2734831"/>
         </p:xfrm>
         <a:graphic>
           <a:graphicData uri="http://schemas.openxmlformats.org/drawingml/2006/table">
@@ -3620,12 +3803,13 @@
                 <a:gridCol w="1265839"/>
                 <a:gridCol w="2814802"/>
               </a:tblGrid>
-              <a:tr h="1056290">
+              <a:tr h="1086229">
                 <a:tc>
                   <a:txBody>
                     <a:bodyPr/>
                     <a:lstStyle/>
                     <a:p>
+                      <a:pPr algn="ctr"/>
                       <a:r>
                         <a:rPr lang="en-US" dirty="0"/>
                         <a:t>Total Tests 169,</a:t>
@@ -3747,7 +3931,7 @@
                   </a:tcPr>
                 </a:tc>
               </a:tr>
-              <a:tr h="780394">
+              <a:tr h="825534">
                 <a:tc>
                   <a:txBody>
                     <a:bodyPr/>
@@ -3764,7 +3948,15 @@
                       </a:r>
                       <a:r>
                         <a:rPr lang="en-US" dirty="0"/>
-                        <a:t> Dir Dist_1o13:Should show fewer results on 5 Mile </a:t>
+                        <a:t> Dir Dist_1o13:Should show fewer results on </a:t>
+                      </a:r>
+                      <a:r>
+                        <a:rPr lang="en-US" dirty="0" smtClean="0"/>
+                        <a:t>15 </a:t>
+                      </a:r>
+                      <a:r>
+                        <a:rPr lang="en-US" dirty="0"/>
+                        <a:t>Mile </a:t>
                       </a:r>
                       <a:r>
                         <a:rPr lang="en-US" dirty="0" err="1"/>
@@ -3772,8 +3964,16 @@
                       </a:r>
                       <a:r>
                         <a:rPr lang="en-US" dirty="0"/>
-                        <a:t> Filter "94949"</a:t>
-                      </a:r>
+                        <a:t> Filter "</a:t>
+                      </a:r>
+                      <a:r>
+                        <a:rPr lang="en-US" dirty="0" smtClean="0"/>
+                        <a:t>94949“</a:t>
+                      </a:r>
+                    </a:p>
+                    <a:p>
+                      <a:pPr algn="l"/>
+                      <a:endParaRPr lang="en-US" dirty="0"/>
                     </a:p>
                   </a:txBody>
                   <a:tcPr marL="22860" marR="22860" marT="22860" marB="22860">
@@ -3890,137 +4090,154 @@
                   </a:tcPr>
                 </a:tc>
               </a:tr>
-            </a:tbl>
-          </a:graphicData>
-        </a:graphic>
-      </p:graphicFrame>
-      <p:graphicFrame>
-        <p:nvGraphicFramePr>
-          <p:cNvPr id="5" name="Table 4"/>
-          <p:cNvGraphicFramePr>
-            <a:graphicFrameLocks noGrp="1"/>
-          </p:cNvGraphicFramePr>
-          <p:nvPr>
-            <p:extLst>
-              <p:ext uri="{D42A27DB-BD31-4B8C-83A1-F6EECF244321}">
-                <p14:modId xmlns:p14="http://schemas.microsoft.com/office/powerpoint/2010/main" val="4114246501"/>
-              </p:ext>
-            </p:extLst>
-          </p:nvPr>
-        </p:nvGraphicFramePr>
-        <p:xfrm>
-          <a:off x="210206" y="2464383"/>
-          <a:ext cx="11813627" cy="2391396"/>
-        </p:xfrm>
-        <a:graphic>
-          <a:graphicData uri="http://schemas.openxmlformats.org/drawingml/2006/table">
-            <a:tbl>
-              <a:tblPr firstRow="1" bandRow="1">
-                <a:tableStyleId>{5C22544A-7EE6-4342-B048-85BDC9FD1C3A}</a:tableStyleId>
-              </a:tblPr>
-              <a:tblGrid>
-                <a:gridCol w="11813627"/>
-              </a:tblGrid>
-              <a:tr h="2391396">
+              <a:tr h="723151">
                 <a:tc>
                   <a:txBody>
                     <a:bodyPr/>
                     <a:lstStyle/>
                     <a:p>
-                      <a:r>
-                        <a:rPr lang="en-US" dirty="0" smtClean="0">
-                          <a:solidFill>
-                            <a:schemeClr val="tx1"/>
-                          </a:solidFill>
-                        </a:rPr>
-                        <a:t>A test run captures and calculates.  </a:t>
-                      </a:r>
-                    </a:p>
-                    <a:p>
-                      <a:r>
-                        <a:rPr lang="en-US" dirty="0" smtClean="0">
-                          <a:solidFill>
-                            <a:schemeClr val="tx1"/>
-                          </a:solidFill>
-                        </a:rPr>
-                        <a:t>Run:</a:t>
-                      </a:r>
-                      <a:r>
-                        <a:rPr lang="en-US" baseline="0" dirty="0" smtClean="0">
-                          <a:solidFill>
-                            <a:schemeClr val="tx1"/>
-                          </a:solidFill>
-                        </a:rPr>
-                        <a:t> number of tests, passes, failures, Duration of the tests in the run summed up.</a:t>
-                      </a:r>
-                    </a:p>
-                    <a:p>
-                      <a:r>
-                        <a:rPr lang="en-US" baseline="0" dirty="0" smtClean="0">
-                          <a:solidFill>
-                            <a:schemeClr val="tx1"/>
-                          </a:solidFill>
-                        </a:rPr>
-                        <a:t>An individual test captures Feature Story it belongs </a:t>
-                      </a:r>
-                      <a:r>
-                        <a:rPr lang="en-US" baseline="0" dirty="0" err="1" smtClean="0">
-                          <a:solidFill>
-                            <a:schemeClr val="tx1"/>
-                          </a:solidFill>
-                        </a:rPr>
-                        <a:t>togi</a:t>
-                      </a:r>
-                      <a:r>
-                        <a:rPr lang="en-US" baseline="0" dirty="0" smtClean="0">
-                          <a:solidFill>
-                            <a:schemeClr val="tx1"/>
-                          </a:solidFill>
-                        </a:rPr>
-                        <a:t> , pass/fail, test duration, Failure notification</a:t>
-                      </a:r>
-                    </a:p>
-                    <a:p>
-                      <a:endParaRPr lang="en-US" baseline="0" dirty="0" smtClean="0">
-                        <a:solidFill>
-                          <a:schemeClr val="tx1"/>
-                        </a:solidFill>
-                      </a:endParaRPr>
-                    </a:p>
-                    <a:p>
-                      <a:r>
-                        <a:rPr lang="en-US" baseline="0" dirty="0" smtClean="0">
-                          <a:solidFill>
-                            <a:schemeClr val="tx1"/>
-                          </a:solidFill>
-                        </a:rPr>
-                        <a:t>We plan to capture</a:t>
-                      </a:r>
-                    </a:p>
-                    <a:p>
-                      <a:r>
-                        <a:rPr lang="en-US" baseline="0" dirty="0" smtClean="0">
-                          <a:solidFill>
-                            <a:schemeClr val="tx1"/>
-                          </a:solidFill>
-                        </a:rPr>
-                        <a:t>Command line that calls the test. The server tested against, the server tested from the average ping test server to app server</a:t>
-                      </a:r>
-                    </a:p>
-                    <a:p>
-                      <a:r>
-                        <a:rPr lang="en-US" baseline="0" dirty="0" smtClean="0">
-                          <a:solidFill>
-                            <a:schemeClr val="tx1"/>
-                          </a:solidFill>
-                        </a:rPr>
-                        <a:t>Browser, browser version</a:t>
+                      <a:pPr algn="l"/>
+                      <a:r>
+                        <a:rPr lang="en-US" dirty="0"/>
+                        <a:t>CXINIT2-1146: </a:t>
+                      </a:r>
+                      <a:r>
+                        <a:rPr lang="en-US" dirty="0" err="1"/>
+                        <a:t>Prov</a:t>
+                      </a:r>
+                      <a:r>
+                        <a:rPr lang="en-US" dirty="0"/>
+                        <a:t> Dir </a:t>
+                      </a:r>
+                      <a:r>
+                        <a:rPr lang="en-US" dirty="0" smtClean="0"/>
+                        <a:t>Dist_2o13:Should </a:t>
+                      </a:r>
+                      <a:r>
+                        <a:rPr lang="en-US" dirty="0"/>
+                        <a:t>show fewer results on 5 Mile </a:t>
+                      </a:r>
+                      <a:r>
+                        <a:rPr lang="en-US" dirty="0" err="1"/>
+                        <a:t>Dist</a:t>
+                      </a:r>
+                      <a:r>
+                        <a:rPr lang="en-US" dirty="0"/>
+                        <a:t> Filter "94949"</a:t>
                       </a:r>
                     </a:p>
                   </a:txBody>
-                  <a:tcPr>
+                  <a:tcPr marL="22860" marR="22860" marT="22860" marB="22860">
+                    <a:lnL>
+                      <a:noFill/>
+                    </a:lnL>
+                    <a:lnR>
+                      <a:noFill/>
+                    </a:lnR>
+                    <a:lnT>
+                      <a:noFill/>
+                    </a:lnT>
+                    <a:lnB>
+                      <a:noFill/>
+                    </a:lnB>
                     <a:solidFill>
-                      <a:schemeClr val="bg1"/>
+                      <a:srgbClr val="FF0000"/>
+                    </a:solidFill>
+                  </a:tcPr>
+                </a:tc>
+                <a:tc>
+                  <a:txBody>
+                    <a:bodyPr/>
+                    <a:lstStyle/>
+                    <a:p>
+                      <a:pPr algn="l"/>
+                      <a:r>
+                        <a:rPr lang="en-US" dirty="0"/>
+                        <a:t>Failed</a:t>
+                      </a:r>
+                    </a:p>
+                  </a:txBody>
+                  <a:tcPr marL="22860" marR="22860" marT="22860" marB="22860">
+                    <a:lnL>
+                      <a:noFill/>
+                    </a:lnL>
+                    <a:lnR>
+                      <a:noFill/>
+                    </a:lnR>
+                    <a:lnT>
+                      <a:noFill/>
+                    </a:lnT>
+                    <a:lnB>
+                      <a:noFill/>
+                    </a:lnB>
+                    <a:solidFill>
+                      <a:srgbClr val="FF0000"/>
+                    </a:solidFill>
+                  </a:tcPr>
+                </a:tc>
+                <a:tc>
+                  <a:txBody>
+                    <a:bodyPr/>
+                    <a:lstStyle/>
+                    <a:p>
+                      <a:pPr algn="l"/>
+                      <a:r>
+                        <a:rPr lang="en-US" dirty="0" smtClean="0"/>
+                        <a:t>2734</a:t>
+                      </a:r>
+                      <a:endParaRPr lang="en-US" dirty="0"/>
+                    </a:p>
+                  </a:txBody>
+                  <a:tcPr marL="22860" marR="22860" marT="22860" marB="22860">
+                    <a:lnL>
+                      <a:noFill/>
+                    </a:lnL>
+                    <a:lnR>
+                      <a:noFill/>
+                    </a:lnR>
+                    <a:lnT>
+                      <a:noFill/>
+                    </a:lnT>
+                    <a:lnB>
+                      <a:noFill/>
+                    </a:lnB>
+                    <a:solidFill>
+                      <a:srgbClr val="FF0000"/>
+                    </a:solidFill>
+                  </a:tcPr>
+                </a:tc>
+                <a:tc>
+                  <a:txBody>
+                    <a:bodyPr/>
+                    <a:lstStyle/>
+                    <a:p>
+                      <a:pPr algn="l"/>
+                      <a:r>
+                        <a:rPr lang="en-US" dirty="0"/>
+                        <a:t>Failed: </a:t>
+                      </a:r>
+                      <a:r>
+                        <a:rPr lang="en-US" dirty="0" err="1" smtClean="0"/>
+                        <a:t>dirSearch.getProvi</a:t>
+                      </a:r>
+                      <a:endParaRPr lang="en-US" dirty="0" smtClean="0"/>
+                    </a:p>
+                  </a:txBody>
+                  <a:tcPr marL="22860" marR="22860" marT="22860" marB="22860">
+                    <a:lnL>
+                      <a:noFill/>
+                    </a:lnL>
+                    <a:lnR>
+                      <a:noFill/>
+                    </a:lnR>
+                    <a:lnT>
+                      <a:noFill/>
+                    </a:lnT>
+                    <a:lnB>
+                      <a:noFill/>
+                    </a:lnB>
+                    <a:solidFill>
+                      <a:srgbClr val="FF0000"/>
                     </a:solidFill>
                   </a:tcPr>
                 </a:tc>
@@ -4029,85 +4246,593 @@
           </a:graphicData>
         </a:graphic>
       </p:graphicFrame>
+    </p:spTree>
+    <p:extLst>
+      <p:ext uri="{BB962C8B-B14F-4D97-AF65-F5344CB8AC3E}">
+        <p14:creationId xmlns:p14="http://schemas.microsoft.com/office/powerpoint/2010/main" val="2050310159"/>
+      </p:ext>
+    </p:extLst>
+  </p:cSld>
+  <p:clrMapOvr>
+    <a:masterClrMapping/>
+  </p:clrMapOvr>
+</p:sld>
+</file>
+
+<file path=ppt/slides/slide5.xml><?xml version="1.0" encoding="utf-8"?>
+<p:sld xmlns:a="http://schemas.openxmlformats.org/drawingml/2006/main" xmlns:r="http://schemas.openxmlformats.org/officeDocument/2006/relationships" xmlns:p="http://schemas.openxmlformats.org/presentationml/2006/main">
+  <p:cSld>
+    <p:spTree>
+      <p:nvGrpSpPr>
+        <p:cNvPr id="1" name=""/>
+        <p:cNvGrpSpPr/>
+        <p:nvPr/>
+      </p:nvGrpSpPr>
+      <p:grpSpPr>
+        <a:xfrm>
+          <a:off x="0" y="0"/>
+          <a:ext cx="0" cy="0"/>
+          <a:chOff x="0" y="0"/>
+          <a:chExt cx="0" cy="0"/>
+        </a:xfrm>
+      </p:grpSpPr>
       <p:graphicFrame>
         <p:nvGraphicFramePr>
-          <p:cNvPr id="6" name="Table 5"/>
+          <p:cNvPr id="7" name="Content Placeholder 3"/>
           <p:cNvGraphicFramePr>
-            <a:graphicFrameLocks noGrp="1"/>
+            <a:graphicFrameLocks/>
           </p:cNvGraphicFramePr>
           <p:nvPr>
             <p:extLst>
               <p:ext uri="{D42A27DB-BD31-4B8C-83A1-F6EECF244321}">
-                <p14:modId xmlns:p14="http://schemas.microsoft.com/office/powerpoint/2010/main" val="1890989084"/>
+                <p14:modId xmlns:p14="http://schemas.microsoft.com/office/powerpoint/2010/main" val="311185812"/>
               </p:ext>
             </p:extLst>
           </p:nvPr>
         </p:nvGraphicFramePr>
         <p:xfrm>
-          <a:off x="210206" y="5139558"/>
-          <a:ext cx="9879724" cy="914400"/>
+          <a:off x="186144" y="1684421"/>
+          <a:ext cx="11177335" cy="4680284"/>
         </p:xfrm>
         <a:graphic>
           <a:graphicData uri="http://schemas.openxmlformats.org/drawingml/2006/table">
             <a:tbl>
-              <a:tblPr firstRow="1" bandRow="1">
-                <a:tableStyleId>{5C22544A-7EE6-4342-B048-85BDC9FD1C3A}</a:tableStyleId>
-              </a:tblPr>
+              <a:tblPr/>
               <a:tblGrid>
-                <a:gridCol w="9879724"/>
+                <a:gridCol w="5467374"/>
+                <a:gridCol w="1658993"/>
+                <a:gridCol w="1256634"/>
+                <a:gridCol w="2794334"/>
               </a:tblGrid>
-              <a:tr h="888124">
+              <a:tr h="2698588">
                 <a:tc>
                   <a:txBody>
                     <a:bodyPr/>
                     <a:lstStyle/>
                     <a:p>
-                      <a:r>
-                        <a:rPr lang="en-US" baseline="0" dirty="0" smtClean="0">
-                          <a:solidFill>
-                            <a:schemeClr val="tx1"/>
-                          </a:solidFill>
-                        </a:rPr>
-                        <a:t>Want to work towards mobile device test automation.  </a:t>
-                      </a:r>
+                      <a:pPr algn="ctr"/>
+                      <a:r>
+                        <a:rPr lang="en-US" dirty="0" smtClean="0"/>
+                        <a:t>Test Date</a:t>
+                      </a:r>
+                      <a:r>
+                        <a:rPr lang="en-US" baseline="0" dirty="0" smtClean="0"/>
+                        <a:t> : Start Time:  End Time</a:t>
+                      </a:r>
+                      <a:endParaRPr lang="en-US" dirty="0" smtClean="0"/>
                     </a:p>
                     <a:p>
-                      <a:r>
-                        <a:rPr lang="en-US" baseline="0" dirty="0" smtClean="0">
-                          <a:solidFill>
-                            <a:schemeClr val="tx1"/>
-                          </a:solidFill>
-                        </a:rPr>
-                        <a:t>Either emulated or actually on device</a:t>
+                      <a:pPr algn="ctr"/>
+                      <a:r>
+                        <a:rPr lang="en-US" dirty="0" smtClean="0"/>
+                        <a:t>Total </a:t>
+                      </a:r>
+                      <a:r>
+                        <a:rPr lang="en-US" dirty="0"/>
+                        <a:t>Tests 169,</a:t>
+                      </a:r>
+                      <a:br>
+                        <a:rPr lang="en-US" dirty="0"/>
+                      </a:br>
+                      <a:r>
+                        <a:rPr lang="en-US" dirty="0"/>
+                        <a:t>Total Pass </a:t>
+                      </a:r>
+                      <a:r>
+                        <a:rPr lang="en-US" dirty="0" smtClean="0"/>
+                        <a:t>0,</a:t>
+                      </a:r>
+                      <a:r>
+                        <a:rPr lang="en-US" baseline="0" dirty="0"/>
+                        <a:t> </a:t>
+                      </a:r>
+                      <a:r>
+                        <a:rPr lang="en-US" baseline="0" dirty="0" smtClean="0"/>
+                        <a:t>        </a:t>
+                      </a:r>
+                      <a:r>
+                        <a:rPr lang="en-US" dirty="0" smtClean="0"/>
+                        <a:t>Total </a:t>
+                      </a:r>
+                      <a:r>
+                        <a:rPr lang="en-US" dirty="0"/>
+                        <a:t>Fail 169,</a:t>
+                      </a:r>
+                      <a:br>
+                        <a:rPr lang="en-US" dirty="0"/>
+                      </a:br>
+                      <a:r>
+                        <a:rPr lang="en-US" dirty="0" smtClean="0"/>
+                        <a:t>Parallel Execution 3.33 Minutes</a:t>
                       </a:r>
                     </a:p>
                     <a:p>
-                      <a:r>
-                        <a:rPr lang="en-US" baseline="0" dirty="0" smtClean="0">
-                          <a:solidFill>
-                            <a:schemeClr val="tx1"/>
-                          </a:solidFill>
-                        </a:rPr>
-                        <a:t>Need to do some research about industry </a:t>
-                      </a:r>
-                      <a:r>
-                        <a:rPr lang="en-US" baseline="0" smtClean="0">
-                          <a:solidFill>
-                            <a:schemeClr val="tx1"/>
-                          </a:solidFill>
-                        </a:rPr>
-                        <a:t>best practices.</a:t>
-                      </a:r>
-                      <a:endParaRPr lang="en-US" baseline="0" dirty="0" smtClean="0">
-                        <a:solidFill>
-                          <a:schemeClr val="tx1"/>
-                        </a:solidFill>
-                      </a:endParaRPr>
+                      <a:pPr algn="ctr"/>
+                      <a:r>
+                        <a:rPr lang="en-US" dirty="0" smtClean="0"/>
+                        <a:t>Total Test time 1.37</a:t>
+                      </a:r>
+                      <a:r>
+                        <a:rPr lang="en-US" baseline="0" dirty="0" smtClean="0"/>
+                        <a:t> Minutes</a:t>
+                      </a:r>
+                    </a:p>
+                    <a:p>
+                      <a:pPr algn="ctr"/>
+                      <a:r>
+                        <a:rPr lang="en-US" baseline="0" dirty="0" smtClean="0"/>
+                        <a:t>Chrome </a:t>
+                      </a:r>
+                      <a:r>
+                        <a:rPr lang="en-US" baseline="0" dirty="0" err="1" smtClean="0"/>
+                        <a:t>Ver</a:t>
+                      </a:r>
+                      <a:r>
+                        <a:rPr lang="en-US" baseline="0" dirty="0" smtClean="0"/>
+                        <a:t> 48.078  | Firefox </a:t>
+                      </a:r>
+                      <a:r>
+                        <a:rPr lang="en-US" baseline="0" dirty="0" err="1" smtClean="0"/>
+                        <a:t>Ver</a:t>
+                      </a:r>
+                      <a:r>
+                        <a:rPr lang="en-US" baseline="0" dirty="0" smtClean="0"/>
+                        <a:t> 7.56</a:t>
+                      </a:r>
+                    </a:p>
+                    <a:p>
+                      <a:pPr algn="ctr"/>
+                      <a:r>
+                        <a:rPr lang="en-US" baseline="0" dirty="0" smtClean="0"/>
+                        <a:t>Test Server:  SACAPPSEID01.DELTADEV.ENT</a:t>
+                      </a:r>
+                    </a:p>
+                    <a:p>
+                      <a:pPr algn="ctr"/>
+                      <a:r>
+                        <a:rPr lang="en-US" baseline="0" dirty="0" smtClean="0"/>
+                        <a:t>Web App Server:  http://mot1.deltadentalins.com</a:t>
+                      </a:r>
+                    </a:p>
+                    <a:p>
+                      <a:pPr algn="ctr"/>
+                      <a:r>
+                        <a:rPr lang="en-US" baseline="0" dirty="0" smtClean="0"/>
+                        <a:t>Ping communication average: 127 </a:t>
+                      </a:r>
+                      <a:r>
+                        <a:rPr lang="en-US" baseline="0" dirty="0" err="1" smtClean="0"/>
+                        <a:t>ms</a:t>
+                      </a:r>
+                      <a:endParaRPr lang="en-US" dirty="0"/>
                     </a:p>
                   </a:txBody>
-                  <a:tcPr>
+                  <a:tcPr marL="22860" marR="22860" marT="22860" marB="22860">
+                    <a:lnL>
+                      <a:noFill/>
+                    </a:lnL>
+                    <a:lnR>
+                      <a:noFill/>
+                    </a:lnR>
+                    <a:lnT>
+                      <a:noFill/>
+                    </a:lnT>
+                    <a:lnB>
+                      <a:noFill/>
+                    </a:lnB>
+                  </a:tcPr>
+                </a:tc>
+                <a:tc>
+                  <a:txBody>
+                    <a:bodyPr/>
+                    <a:lstStyle/>
+                    <a:p>
+                      <a:endParaRPr lang="en-US" dirty="0" smtClean="0"/>
+                    </a:p>
+                    <a:p>
+                      <a:r>
+                        <a:rPr lang="en-US" dirty="0" smtClean="0"/>
+                        <a:t>Result</a:t>
+                      </a:r>
+                      <a:endParaRPr lang="en-US" dirty="0"/>
+                    </a:p>
+                  </a:txBody>
+                  <a:tcPr marL="22860" marR="22860" marT="22860" marB="22860">
+                    <a:lnL>
+                      <a:noFill/>
+                    </a:lnL>
+                    <a:lnR>
+                      <a:noFill/>
+                    </a:lnR>
+                    <a:lnT>
+                      <a:noFill/>
+                    </a:lnT>
+                    <a:lnB>
+                      <a:noFill/>
+                    </a:lnB>
+                  </a:tcPr>
+                </a:tc>
+                <a:tc>
+                  <a:txBody>
+                    <a:bodyPr/>
+                    <a:lstStyle/>
+                    <a:p>
+                      <a:endParaRPr lang="en-US" dirty="0" smtClean="0"/>
+                    </a:p>
+                    <a:p>
+                      <a:r>
+                        <a:rPr lang="en-US" dirty="0" smtClean="0"/>
+                        <a:t>Single Test</a:t>
+                      </a:r>
+                    </a:p>
+                    <a:p>
+                      <a:r>
+                        <a:rPr lang="en-US" dirty="0" smtClean="0"/>
+                        <a:t>Duration</a:t>
+                      </a:r>
+                      <a:endParaRPr lang="en-US" dirty="0"/>
+                    </a:p>
+                  </a:txBody>
+                  <a:tcPr marL="22860" marR="22860" marT="22860" marB="22860">
+                    <a:lnL>
+                      <a:noFill/>
+                    </a:lnL>
+                    <a:lnR>
+                      <a:noFill/>
+                    </a:lnR>
+                    <a:lnT>
+                      <a:noFill/>
+                    </a:lnT>
+                    <a:lnB>
+                      <a:noFill/>
+                    </a:lnB>
+                  </a:tcPr>
+                </a:tc>
+                <a:tc>
+                  <a:txBody>
+                    <a:bodyPr/>
+                    <a:lstStyle/>
+                    <a:p>
+                      <a:endParaRPr lang="en-US" dirty="0" smtClean="0"/>
+                    </a:p>
+                    <a:p>
+                      <a:r>
+                        <a:rPr lang="en-US" dirty="0" smtClean="0"/>
+                        <a:t>Error </a:t>
+                      </a:r>
+                      <a:r>
+                        <a:rPr lang="en-US" dirty="0"/>
+                        <a:t>Message</a:t>
+                      </a:r>
+                    </a:p>
+                  </a:txBody>
+                  <a:tcPr marL="22860" marR="22860" marT="22860" marB="22860">
+                    <a:lnL>
+                      <a:noFill/>
+                    </a:lnL>
+                    <a:lnR>
+                      <a:noFill/>
+                    </a:lnR>
+                    <a:lnT>
+                      <a:noFill/>
+                    </a:lnT>
+                    <a:lnB>
+                      <a:noFill/>
+                    </a:lnB>
+                  </a:tcPr>
+                </a:tc>
+              </a:tr>
+              <a:tr h="990848">
+                <a:tc>
+                  <a:txBody>
+                    <a:bodyPr/>
+                    <a:lstStyle/>
+                    <a:p>
+                      <a:pPr algn="l"/>
+                      <a:r>
+                        <a:rPr lang="en-US" dirty="0"/>
+                        <a:t>CXINIT2-1146: </a:t>
+                      </a:r>
+                      <a:r>
+                        <a:rPr lang="en-US" dirty="0" err="1"/>
+                        <a:t>Prov</a:t>
+                      </a:r>
+                      <a:r>
+                        <a:rPr lang="en-US" dirty="0"/>
+                        <a:t> Dir Dist_1o13:Should show fewer results on 5 Mile </a:t>
+                      </a:r>
+                      <a:r>
+                        <a:rPr lang="en-US" dirty="0" err="1"/>
+                        <a:t>Dist</a:t>
+                      </a:r>
+                      <a:r>
+                        <a:rPr lang="en-US" dirty="0"/>
+                        <a:t> Filter "94949"</a:t>
+                      </a:r>
+                    </a:p>
+                  </a:txBody>
+                  <a:tcPr marL="22860" marR="22860" marT="22860" marB="22860">
+                    <a:lnL>
+                      <a:noFill/>
+                    </a:lnL>
+                    <a:lnR>
+                      <a:noFill/>
+                    </a:lnR>
+                    <a:lnT>
+                      <a:noFill/>
+                    </a:lnT>
+                    <a:lnB>
+                      <a:noFill/>
+                    </a:lnB>
                     <a:solidFill>
-                      <a:schemeClr val="bg1"/>
+                      <a:srgbClr val="FF0000"/>
+                    </a:solidFill>
+                  </a:tcPr>
+                </a:tc>
+                <a:tc>
+                  <a:txBody>
+                    <a:bodyPr/>
+                    <a:lstStyle/>
+                    <a:p>
+                      <a:pPr algn="l"/>
+                      <a:r>
+                        <a:rPr lang="en-US" dirty="0"/>
+                        <a:t>Failed</a:t>
+                      </a:r>
+                    </a:p>
+                  </a:txBody>
+                  <a:tcPr marL="22860" marR="22860" marT="22860" marB="22860">
+                    <a:lnL>
+                      <a:noFill/>
+                    </a:lnL>
+                    <a:lnR>
+                      <a:noFill/>
+                    </a:lnR>
+                    <a:lnT>
+                      <a:noFill/>
+                    </a:lnT>
+                    <a:lnB>
+                      <a:noFill/>
+                    </a:lnB>
+                    <a:solidFill>
+                      <a:srgbClr val="FF0000"/>
+                    </a:solidFill>
+                  </a:tcPr>
+                </a:tc>
+                <a:tc>
+                  <a:txBody>
+                    <a:bodyPr/>
+                    <a:lstStyle/>
+                    <a:p>
+                      <a:pPr algn="l"/>
+                      <a:r>
+                        <a:rPr lang="en-US" dirty="0"/>
+                        <a:t>3390</a:t>
+                      </a:r>
+                    </a:p>
+                  </a:txBody>
+                  <a:tcPr marL="22860" marR="22860" marT="22860" marB="22860">
+                    <a:lnL>
+                      <a:noFill/>
+                    </a:lnL>
+                    <a:lnR>
+                      <a:noFill/>
+                    </a:lnR>
+                    <a:lnT>
+                      <a:noFill/>
+                    </a:lnT>
+                    <a:lnB>
+                      <a:noFill/>
+                    </a:lnB>
+                    <a:solidFill>
+                      <a:srgbClr val="FF0000"/>
+                    </a:solidFill>
+                  </a:tcPr>
+                </a:tc>
+                <a:tc>
+                  <a:txBody>
+                    <a:bodyPr/>
+                    <a:lstStyle/>
+                    <a:p>
+                      <a:pPr algn="l"/>
+                      <a:r>
+                        <a:rPr lang="en-US" dirty="0"/>
+                        <a:t>Failed: </a:t>
+                      </a:r>
+                      <a:r>
+                        <a:rPr lang="en-US" dirty="0" err="1" smtClean="0"/>
+                        <a:t>dirSearch.getProvi</a:t>
+                      </a:r>
+                      <a:endParaRPr lang="en-US" dirty="0" smtClean="0"/>
+                    </a:p>
+                  </a:txBody>
+                  <a:tcPr marL="22860" marR="22860" marT="22860" marB="22860">
+                    <a:lnL>
+                      <a:noFill/>
+                    </a:lnL>
+                    <a:lnR>
+                      <a:noFill/>
+                    </a:lnR>
+                    <a:lnT>
+                      <a:noFill/>
+                    </a:lnT>
+                    <a:lnB>
+                      <a:noFill/>
+                    </a:lnB>
+                    <a:solidFill>
+                      <a:srgbClr val="FF0000"/>
+                    </a:solidFill>
+                  </a:tcPr>
+                </a:tc>
+              </a:tr>
+              <a:tr h="990848">
+                <a:tc>
+                  <a:txBody>
+                    <a:bodyPr/>
+                    <a:lstStyle/>
+                    <a:p>
+                      <a:pPr algn="l"/>
+                      <a:r>
+                        <a:rPr lang="en-US" dirty="0"/>
+                        <a:t>CXINIT2-1146: </a:t>
+                      </a:r>
+                      <a:r>
+                        <a:rPr lang="en-US" dirty="0" err="1"/>
+                        <a:t>Prov</a:t>
+                      </a:r>
+                      <a:r>
+                        <a:rPr lang="en-US" dirty="0"/>
+                        <a:t> Dir </a:t>
+                      </a:r>
+                      <a:r>
+                        <a:rPr lang="en-US" dirty="0" smtClean="0"/>
+                        <a:t>Dist_2o13:Should </a:t>
+                      </a:r>
+                      <a:r>
+                        <a:rPr lang="en-US" dirty="0"/>
+                        <a:t>show fewer results on 5 Mile </a:t>
+                      </a:r>
+                      <a:r>
+                        <a:rPr lang="en-US" dirty="0" err="1"/>
+                        <a:t>Dist</a:t>
+                      </a:r>
+                      <a:r>
+                        <a:rPr lang="en-US" dirty="0"/>
+                        <a:t> Filter "94949"</a:t>
+                      </a:r>
+                    </a:p>
+                  </a:txBody>
+                  <a:tcPr marL="22860" marR="22860" marT="22860" marB="22860">
+                    <a:lnL>
+                      <a:noFill/>
+                    </a:lnL>
+                    <a:lnR>
+                      <a:noFill/>
+                    </a:lnR>
+                    <a:lnT>
+                      <a:noFill/>
+                    </a:lnT>
+                    <a:lnB>
+                      <a:noFill/>
+                    </a:lnB>
+                    <a:solidFill>
+                      <a:srgbClr val="FF0000"/>
+                    </a:solidFill>
+                  </a:tcPr>
+                </a:tc>
+                <a:tc>
+                  <a:txBody>
+                    <a:bodyPr/>
+                    <a:lstStyle/>
+                    <a:p>
+                      <a:pPr algn="l"/>
+                      <a:r>
+                        <a:rPr lang="en-US" dirty="0"/>
+                        <a:t>Failed</a:t>
+                      </a:r>
+                    </a:p>
+                  </a:txBody>
+                  <a:tcPr marL="22860" marR="22860" marT="22860" marB="22860">
+                    <a:lnL>
+                      <a:noFill/>
+                    </a:lnL>
+                    <a:lnR>
+                      <a:noFill/>
+                    </a:lnR>
+                    <a:lnT>
+                      <a:noFill/>
+                    </a:lnT>
+                    <a:lnB>
+                      <a:noFill/>
+                    </a:lnB>
+                    <a:solidFill>
+                      <a:srgbClr val="FF0000"/>
+                    </a:solidFill>
+                  </a:tcPr>
+                </a:tc>
+                <a:tc>
+                  <a:txBody>
+                    <a:bodyPr/>
+                    <a:lstStyle/>
+                    <a:p>
+                      <a:pPr algn="l"/>
+                      <a:r>
+                        <a:rPr lang="en-US" dirty="0" smtClean="0"/>
+                        <a:t>2734</a:t>
+                      </a:r>
+                      <a:endParaRPr lang="en-US" dirty="0"/>
+                    </a:p>
+                  </a:txBody>
+                  <a:tcPr marL="22860" marR="22860" marT="22860" marB="22860">
+                    <a:lnL>
+                      <a:noFill/>
+                    </a:lnL>
+                    <a:lnR>
+                      <a:noFill/>
+                    </a:lnR>
+                    <a:lnT>
+                      <a:noFill/>
+                    </a:lnT>
+                    <a:lnB>
+                      <a:noFill/>
+                    </a:lnB>
+                    <a:solidFill>
+                      <a:srgbClr val="FF0000"/>
+                    </a:solidFill>
+                  </a:tcPr>
+                </a:tc>
+                <a:tc>
+                  <a:txBody>
+                    <a:bodyPr/>
+                    <a:lstStyle/>
+                    <a:p>
+                      <a:pPr algn="l"/>
+                      <a:r>
+                        <a:rPr lang="en-US" dirty="0"/>
+                        <a:t>Failed: </a:t>
+                      </a:r>
+                      <a:r>
+                        <a:rPr lang="en-US" dirty="0" err="1" smtClean="0"/>
+                        <a:t>dirSearch.getProvi</a:t>
+                      </a:r>
+                      <a:endParaRPr lang="en-US" dirty="0" smtClean="0"/>
+                    </a:p>
+                  </a:txBody>
+                  <a:tcPr marL="22860" marR="22860" marT="22860" marB="22860">
+                    <a:lnL>
+                      <a:noFill/>
+                    </a:lnL>
+                    <a:lnR>
+                      <a:noFill/>
+                    </a:lnR>
+                    <a:lnT>
+                      <a:noFill/>
+                    </a:lnT>
+                    <a:lnB>
+                      <a:noFill/>
+                    </a:lnB>
+                    <a:solidFill>
+                      <a:srgbClr val="FF0000"/>
                     </a:solidFill>
                   </a:tcPr>
                 </a:tc>
@@ -4116,6 +4841,61 @@
           </a:graphicData>
         </a:graphic>
       </p:graphicFrame>
+      <p:sp>
+        <p:nvSpPr>
+          <p:cNvPr id="2" name="Rectangle 1"/>
+          <p:cNvSpPr/>
+          <p:nvPr/>
+        </p:nvSpPr>
+        <p:spPr>
+          <a:xfrm>
+            <a:off x="186144" y="174445"/>
+            <a:ext cx="11259208" cy="1200329"/>
+          </a:xfrm>
+          <a:prstGeom prst="rect">
+            <a:avLst/>
+          </a:prstGeom>
+        </p:spPr>
+        <p:txBody>
+          <a:bodyPr wrap="square">
+            <a:spAutoFit/>
+          </a:bodyPr>
+          <a:lstStyle/>
+          <a:p>
+            <a:r>
+              <a:rPr lang="en-US" dirty="0" smtClean="0"/>
+              <a:t>We </a:t>
+            </a:r>
+            <a:r>
+              <a:rPr lang="en-US" dirty="0"/>
+              <a:t>plan to capture Command line that calls the test. </a:t>
+            </a:r>
+          </a:p>
+          <a:p>
+            <a:r>
+              <a:rPr lang="en-US" dirty="0"/>
+              <a:t>The server tested against, the server tested from the </a:t>
+            </a:r>
+          </a:p>
+          <a:p>
+            <a:r>
+              <a:rPr lang="en-US" dirty="0"/>
+              <a:t>average ping test server to app server</a:t>
+            </a:r>
+          </a:p>
+          <a:p>
+            <a:r>
+              <a:rPr lang="en-US" dirty="0"/>
+              <a:t>Browser, browser </a:t>
+            </a:r>
+            <a:r>
+              <a:rPr lang="en-US" dirty="0" smtClean="0"/>
+              <a:t>version</a:t>
+            </a:r>
+            <a:endParaRPr lang="en-US" dirty="0"/>
+          </a:p>
+        </p:txBody>
+      </p:sp>
     </p:spTree>
     <p:extLst>
       <p:ext uri="{BB962C8B-B14F-4D97-AF65-F5344CB8AC3E}">

</xml_diff>